<commit_message>
Updated the website with login , register and session history
</commit_message>
<xml_diff>
--- a/Code-Translator.pptx
+++ b/Code-Translator.pptx
@@ -276,7 +276,7 @@
           <a:p>
             <a:fld id="{8F6F3255-5DF1-4C24-82EE-D439E3051E60}" type="datetimeFigureOut">
               <a:rPr lang="en-IN" smtClean="0"/>
-              <a:t>19-03-2025</a:t>
+              <a:t>18-04-2025</a:t>
             </a:fld>
             <a:endParaRPr lang="en-IN"/>
           </a:p>
@@ -476,7 +476,7 @@
           <a:p>
             <a:fld id="{8F6F3255-5DF1-4C24-82EE-D439E3051E60}" type="datetimeFigureOut">
               <a:rPr lang="en-IN" smtClean="0"/>
-              <a:t>19-03-2025</a:t>
+              <a:t>18-04-2025</a:t>
             </a:fld>
             <a:endParaRPr lang="en-IN"/>
           </a:p>
@@ -686,7 +686,7 @@
           <a:p>
             <a:fld id="{8F6F3255-5DF1-4C24-82EE-D439E3051E60}" type="datetimeFigureOut">
               <a:rPr lang="en-IN" smtClean="0"/>
-              <a:t>19-03-2025</a:t>
+              <a:t>18-04-2025</a:t>
             </a:fld>
             <a:endParaRPr lang="en-IN"/>
           </a:p>
@@ -886,7 +886,7 @@
           <a:p>
             <a:fld id="{8F6F3255-5DF1-4C24-82EE-D439E3051E60}" type="datetimeFigureOut">
               <a:rPr lang="en-IN" smtClean="0"/>
-              <a:t>19-03-2025</a:t>
+              <a:t>18-04-2025</a:t>
             </a:fld>
             <a:endParaRPr lang="en-IN"/>
           </a:p>
@@ -1162,7 +1162,7 @@
           <a:p>
             <a:fld id="{8F6F3255-5DF1-4C24-82EE-D439E3051E60}" type="datetimeFigureOut">
               <a:rPr lang="en-IN" smtClean="0"/>
-              <a:t>19-03-2025</a:t>
+              <a:t>18-04-2025</a:t>
             </a:fld>
             <a:endParaRPr lang="en-IN"/>
           </a:p>
@@ -1430,7 +1430,7 @@
           <a:p>
             <a:fld id="{8F6F3255-5DF1-4C24-82EE-D439E3051E60}" type="datetimeFigureOut">
               <a:rPr lang="en-IN" smtClean="0"/>
-              <a:t>19-03-2025</a:t>
+              <a:t>18-04-2025</a:t>
             </a:fld>
             <a:endParaRPr lang="en-IN"/>
           </a:p>
@@ -1845,7 +1845,7 @@
           <a:p>
             <a:fld id="{8F6F3255-5DF1-4C24-82EE-D439E3051E60}" type="datetimeFigureOut">
               <a:rPr lang="en-IN" smtClean="0"/>
-              <a:t>19-03-2025</a:t>
+              <a:t>18-04-2025</a:t>
             </a:fld>
             <a:endParaRPr lang="en-IN"/>
           </a:p>
@@ -1987,7 +1987,7 @@
           <a:p>
             <a:fld id="{8F6F3255-5DF1-4C24-82EE-D439E3051E60}" type="datetimeFigureOut">
               <a:rPr lang="en-IN" smtClean="0"/>
-              <a:t>19-03-2025</a:t>
+              <a:t>18-04-2025</a:t>
             </a:fld>
             <a:endParaRPr lang="en-IN"/>
           </a:p>
@@ -2100,7 +2100,7 @@
           <a:p>
             <a:fld id="{8F6F3255-5DF1-4C24-82EE-D439E3051E60}" type="datetimeFigureOut">
               <a:rPr lang="en-IN" smtClean="0"/>
-              <a:t>19-03-2025</a:t>
+              <a:t>18-04-2025</a:t>
             </a:fld>
             <a:endParaRPr lang="en-IN"/>
           </a:p>
@@ -2413,7 +2413,7 @@
           <a:p>
             <a:fld id="{8F6F3255-5DF1-4C24-82EE-D439E3051E60}" type="datetimeFigureOut">
               <a:rPr lang="en-IN" smtClean="0"/>
-              <a:t>19-03-2025</a:t>
+              <a:t>18-04-2025</a:t>
             </a:fld>
             <a:endParaRPr lang="en-IN"/>
           </a:p>
@@ -2702,7 +2702,7 @@
           <a:p>
             <a:fld id="{8F6F3255-5DF1-4C24-82EE-D439E3051E60}" type="datetimeFigureOut">
               <a:rPr lang="en-IN" smtClean="0"/>
-              <a:t>19-03-2025</a:t>
+              <a:t>18-04-2025</a:t>
             </a:fld>
             <a:endParaRPr lang="en-IN"/>
           </a:p>
@@ -2945,7 +2945,7 @@
           <a:p>
             <a:fld id="{8F6F3255-5DF1-4C24-82EE-D439E3051E60}" type="datetimeFigureOut">
               <a:rPr lang="en-IN" smtClean="0"/>
-              <a:t>19-03-2025</a:t>
+              <a:t>18-04-2025</a:t>
             </a:fld>
             <a:endParaRPr lang="en-IN"/>
           </a:p>

</xml_diff>